<commit_message>
Updated slides and added some probabilistic forecasting code
</commit_message>
<xml_diff>
--- a/slides/day 3/D3C2_Transformers.pptx
+++ b/slides/day 3/D3C2_Transformers.pptx
@@ -138,7 +138,7 @@
 <file path=ppt/charts/chart1.xml><?xml version="1.0" encoding="utf-8"?>
 <c:chartSpace xmlns:c="http://schemas.openxmlformats.org/drawingml/2006/chart" xmlns:a="http://schemas.openxmlformats.org/drawingml/2006/main" xmlns:r="http://schemas.openxmlformats.org/officeDocument/2006/relationships" xmlns:c16r2="http://schemas.microsoft.com/office/drawing/2015/06/chart">
   <c:date1904 val="0"/>
-  <c:lang val="en-GB"/>
+  <c:lang val="en-US"/>
   <c:roundedCorners val="1"/>
   <mc:AlternateContent xmlns:mc="http://schemas.openxmlformats.org/markup-compatibility/2006">
     <mc:Choice xmlns:c14="http://schemas.microsoft.com/office/drawing/2007/8/2/chart" Requires="c14">
@@ -847,7 +847,7 @@
 <file path=ppt/charts/chart2.xml><?xml version="1.0" encoding="utf-8"?>
 <c:chartSpace xmlns:c="http://schemas.openxmlformats.org/drawingml/2006/chart" xmlns:a="http://schemas.openxmlformats.org/drawingml/2006/main" xmlns:r="http://schemas.openxmlformats.org/officeDocument/2006/relationships" xmlns:c16r2="http://schemas.microsoft.com/office/drawing/2015/06/chart">
   <c:date1904 val="0"/>
-  <c:lang val="en-GB"/>
+  <c:lang val="en-US"/>
   <c:roundedCorners val="1"/>
   <c:style val="2"/>
   <c:chart>
@@ -1195,7 +1195,7 @@
           <a:p>
             <a:fld id="{FF5685EE-3D40-0A4E-BB88-46887330FC0A}" type="datetimeFigureOut">
               <a:rPr lang="en-US" smtClean="0"/>
-              <a:t>10/3/25</a:t>
+              <a:t>10/4/2025</a:t>
             </a:fld>
             <a:endParaRPr lang="en-US"/>
           </a:p>
@@ -1755,7 +1755,7 @@
             <a:fld id="{16F2FB5F-D553-C945-B874-A642CC0C851F}" type="datetime3">
               <a:rPr lang="en-IE" smtClean="0"/>
               <a:pPr/>
-              <a:t>3 October 2025</a:t>
+              <a:t>4 October 2025</a:t>
             </a:fld>
             <a:endParaRPr lang="en-US" dirty="0"/>
           </a:p>
@@ -2648,7 +2648,7 @@
             <a:fld id="{16F2FB5F-D553-C945-B874-A642CC0C851F}" type="datetime3">
               <a:rPr lang="en-IE" smtClean="0"/>
               <a:pPr/>
-              <a:t>3 October 2025</a:t>
+              <a:t>4 October 2025</a:t>
             </a:fld>
             <a:endParaRPr lang="en-US" dirty="0"/>
           </a:p>
@@ -2926,7 +2926,7 @@
             <a:fld id="{16F2FB5F-D553-C945-B874-A642CC0C851F}" type="datetime3">
               <a:rPr lang="en-IE" smtClean="0"/>
               <a:pPr/>
-              <a:t>3 October 2025</a:t>
+              <a:t>4 October 2025</a:t>
             </a:fld>
             <a:endParaRPr lang="en-US" dirty="0"/>
           </a:p>
@@ -10482,8 +10482,8 @@
           </a:p>
         </p:txBody>
       </p:sp>
-      <mc:AlternateContent xmlns:mc="http://schemas.openxmlformats.org/markup-compatibility/2006">
-        <mc:Choice xmlns:a14="http://schemas.microsoft.com/office/drawing/2010/main" Requires="a14">
+      <mc:AlternateContent xmlns:mc="http://schemas.openxmlformats.org/markup-compatibility/2006" xmlns:a14="http://schemas.microsoft.com/office/drawing/2010/main">
+        <mc:Choice Requires="a14">
           <p:sp>
             <p:nvSpPr>
               <p:cNvPr id="3" name="Content Placeholder 2">
@@ -10709,7 +10709,7 @@
             </p:txBody>
           </p:sp>
         </mc:Choice>
-        <mc:Fallback>
+        <mc:Fallback xmlns="">
           <p:sp>
             <p:nvSpPr>
               <p:cNvPr id="3" name="Content Placeholder 2">
@@ -10807,8 +10807,8 @@
           </a:p>
         </p:txBody>
       </p:sp>
-      <mc:AlternateContent xmlns:mc="http://schemas.openxmlformats.org/markup-compatibility/2006">
-        <mc:Choice xmlns:a14="http://schemas.microsoft.com/office/drawing/2010/main" Requires="a14">
+      <mc:AlternateContent xmlns:mc="http://schemas.openxmlformats.org/markup-compatibility/2006" xmlns:a14="http://schemas.microsoft.com/office/drawing/2010/main">
+        <mc:Choice Requires="a14">
           <p:sp>
             <p:nvSpPr>
               <p:cNvPr id="3" name="Content Placeholder 2">
@@ -10981,7 +10981,7 @@
             </p:txBody>
           </p:sp>
         </mc:Choice>
-        <mc:Fallback>
+        <mc:Fallback xmlns="">
           <p:sp>
             <p:nvSpPr>
               <p:cNvPr id="3" name="Content Placeholder 2">
@@ -11291,8 +11291,8 @@
           </a:p>
         </p:txBody>
       </p:sp>
-      <mc:AlternateContent xmlns:mc="http://schemas.openxmlformats.org/markup-compatibility/2006">
-        <mc:Choice xmlns:a14="http://schemas.microsoft.com/office/drawing/2010/main" Requires="a14">
+      <mc:AlternateContent xmlns:mc="http://schemas.openxmlformats.org/markup-compatibility/2006" xmlns:a14="http://schemas.microsoft.com/office/drawing/2010/main">
+        <mc:Choice Requires="a14">
           <p:sp>
             <p:nvSpPr>
               <p:cNvPr id="3" name="Content Placeholder 2">
@@ -11375,7 +11375,7 @@
             </p:txBody>
           </p:sp>
         </mc:Choice>
-        <mc:Fallback>
+        <mc:Fallback xmlns="">
           <p:sp>
             <p:nvSpPr>
               <p:cNvPr id="3" name="Content Placeholder 2">

</xml_diff>

<commit_message>
Update slides and add wandb tutorial
</commit_message>
<xml_diff>
--- a/slides/day 3/D3C2_Transformers.pptx
+++ b/slides/day 3/D3C2_Transformers.pptx
@@ -1,11 +1,11 @@
 
 <file path=ppt/presentation.xml><?xml version="1.0" encoding="utf-8"?>
-<p:presentation xmlns:a="http://schemas.openxmlformats.org/drawingml/2006/main" xmlns:r="http://schemas.openxmlformats.org/officeDocument/2006/relationships" xmlns:p="http://schemas.openxmlformats.org/presentationml/2006/main" saveSubsetFonts="1" autoCompressPictures="0">
+<p:presentation xmlns:a="http://schemas.openxmlformats.org/drawingml/2006/main" xmlns:r="http://schemas.openxmlformats.org/officeDocument/2006/relationships" xmlns:p="http://schemas.openxmlformats.org/presentationml/2006/main" showSpecialPlsOnTitleSld="0" saveSubsetFonts="1" autoCompressPictures="0">
   <p:sldMasterIdLst>
     <p:sldMasterId id="2147483648" r:id="rId1"/>
   </p:sldMasterIdLst>
   <p:notesMasterIdLst>
-    <p:notesMasterId r:id="rId23"/>
+    <p:notesMasterId r:id="rId24"/>
   </p:notesMasterIdLst>
   <p:sldIdLst>
     <p:sldId id="256" r:id="rId2"/>
@@ -23,12 +23,13 @@
     <p:sldId id="324" r:id="rId14"/>
     <p:sldId id="276" r:id="rId15"/>
     <p:sldId id="303" r:id="rId16"/>
-    <p:sldId id="304" r:id="rId17"/>
-    <p:sldId id="305" r:id="rId18"/>
-    <p:sldId id="325" r:id="rId19"/>
-    <p:sldId id="285" r:id="rId20"/>
-    <p:sldId id="321" r:id="rId21"/>
-    <p:sldId id="322" r:id="rId22"/>
+    <p:sldId id="326" r:id="rId17"/>
+    <p:sldId id="304" r:id="rId18"/>
+    <p:sldId id="305" r:id="rId19"/>
+    <p:sldId id="325" r:id="rId20"/>
+    <p:sldId id="285" r:id="rId21"/>
+    <p:sldId id="321" r:id="rId22"/>
+    <p:sldId id="322" r:id="rId23"/>
   </p:sldIdLst>
   <p:sldSz cx="12192000" cy="6858000"/>
   <p:notesSz cx="6858000" cy="9144000"/>
@@ -1752,11 +1753,6 @@
             </a:lvl1pPr>
           </a:lstStyle>
           <a:p>
-            <a:fld id="{16F2FB5F-D553-C945-B874-A642CC0C851F}" type="datetime3">
-              <a:rPr lang="en-IE" smtClean="0"/>
-              <a:pPr/>
-              <a:t>4 October 2025</a:t>
-            </a:fld>
             <a:endParaRPr lang="en-US" dirty="0"/>
           </a:p>
         </p:txBody>
@@ -2645,11 +2641,6 @@
             </a:lvl1pPr>
           </a:lstStyle>
           <a:p>
-            <a:fld id="{16F2FB5F-D553-C945-B874-A642CC0C851F}" type="datetime3">
-              <a:rPr lang="en-IE" smtClean="0"/>
-              <a:pPr/>
-              <a:t>4 October 2025</a:t>
-            </a:fld>
             <a:endParaRPr lang="en-US" dirty="0"/>
           </a:p>
         </p:txBody>
@@ -2923,11 +2914,6 @@
             </a:lvl1pPr>
           </a:lstStyle>
           <a:p>
-            <a:fld id="{16F2FB5F-D553-C945-B874-A642CC0C851F}" type="datetime3">
-              <a:rPr lang="en-IE" smtClean="0"/>
-              <a:pPr/>
-              <a:t>4 October 2025</a:t>
-            </a:fld>
             <a:endParaRPr lang="en-US" dirty="0"/>
           </a:p>
         </p:txBody>
@@ -4164,10 +4150,7 @@
             </a:lvl1pPr>
           </a:lstStyle>
           <a:p>
-            <a:r>
-              <a:rPr lang="en-US" dirty="0"/>
-              <a:t>Andrew Parnell</a:t>
-            </a:r>
+            <a:endParaRPr lang="en-US" dirty="0"/>
           </a:p>
         </p:txBody>
       </p:sp>
@@ -4241,7 +4224,7 @@
     <p:sldLayoutId id="2147483666" r:id="rId12"/>
     <p:sldLayoutId id="2147483667" r:id="rId13"/>
   </p:sldLayoutIdLst>
-  <p:hf sldNum="0" hdr="0" ftr="0"/>
+  <p:hf hdr="0" ftr="0" dt="0"/>
   <p:txStyles>
     <p:titleStyle>
       <a:lvl1pPr algn="l" defTabSz="914400" rtl="0" eaLnBrk="1" latinLnBrk="0" hangingPunct="1">
@@ -4715,6 +4698,35 @@
           </a:graphicData>
         </a:graphic>
       </p:graphicFrame>
+      <p:sp>
+        <p:nvSpPr>
+          <p:cNvPr id="5" name="Slide Number Placeholder 4">
+            <a:extLst>
+              <a:ext uri="{FF2B5EF4-FFF2-40B4-BE49-F238E27FC236}">
+                <a16:creationId xmlns:a16="http://schemas.microsoft.com/office/drawing/2014/main" id="{9DCA06C8-650E-CF64-50C9-6F9B4C4595EE}"/>
+              </a:ext>
+            </a:extLst>
+          </p:cNvPr>
+          <p:cNvSpPr>
+            <a:spLocks noGrp="1"/>
+          </p:cNvSpPr>
+          <p:nvPr>
+            <p:ph type="sldNum" sz="quarter" idx="12"/>
+          </p:nvPr>
+        </p:nvSpPr>
+        <p:spPr/>
+        <p:txBody>
+          <a:bodyPr/>
+          <a:lstStyle/>
+          <a:p>
+            <a:fld id="{5A064C77-022D-3743-A04E-645624933D1D}" type="slidenum">
+              <a:rPr lang="en-US" smtClean="0"/>
+              <a:t>10</a:t>
+            </a:fld>
+            <a:endParaRPr lang="en-US"/>
+          </a:p>
+        </p:txBody>
+      </p:sp>
     </p:spTree>
     <p:extLst>
       <p:ext uri="{BB962C8B-B14F-4D97-AF65-F5344CB8AC3E}">
@@ -5624,6 +5636,35 @@
           </a:p>
         </p:txBody>
       </p:sp>
+      <p:sp>
+        <p:nvSpPr>
+          <p:cNvPr id="24" name="Slide Number Placeholder 23">
+            <a:extLst>
+              <a:ext uri="{FF2B5EF4-FFF2-40B4-BE49-F238E27FC236}">
+                <a16:creationId xmlns:a16="http://schemas.microsoft.com/office/drawing/2014/main" id="{82D61CB7-D58D-537A-30E4-F020D0DD7AA5}"/>
+              </a:ext>
+            </a:extLst>
+          </p:cNvPr>
+          <p:cNvSpPr>
+            <a:spLocks noGrp="1"/>
+          </p:cNvSpPr>
+          <p:nvPr>
+            <p:ph type="sldNum" sz="quarter" idx="12"/>
+          </p:nvPr>
+        </p:nvSpPr>
+        <p:spPr/>
+        <p:txBody>
+          <a:bodyPr/>
+          <a:lstStyle/>
+          <a:p>
+            <a:fld id="{5A064C77-022D-3743-A04E-645624933D1D}" type="slidenum">
+              <a:rPr lang="en-US" smtClean="0"/>
+              <a:t>11</a:t>
+            </a:fld>
+            <a:endParaRPr lang="en-US"/>
+          </a:p>
+        </p:txBody>
+      </p:sp>
     </p:spTree>
     <p:extLst>
       <p:ext uri="{BB962C8B-B14F-4D97-AF65-F5344CB8AC3E}">
@@ -6136,6 +6177,35 @@
           </a:p>
         </p:txBody>
       </p:sp>
+      <p:sp>
+        <p:nvSpPr>
+          <p:cNvPr id="4" name="Slide Number Placeholder 3">
+            <a:extLst>
+              <a:ext uri="{FF2B5EF4-FFF2-40B4-BE49-F238E27FC236}">
+                <a16:creationId xmlns:a16="http://schemas.microsoft.com/office/drawing/2014/main" id="{AB2906B3-0628-32AC-B1F4-B7DDEDB58951}"/>
+              </a:ext>
+            </a:extLst>
+          </p:cNvPr>
+          <p:cNvSpPr>
+            <a:spLocks noGrp="1"/>
+          </p:cNvSpPr>
+          <p:nvPr>
+            <p:ph type="sldNum" sz="quarter" idx="12"/>
+          </p:nvPr>
+        </p:nvSpPr>
+        <p:spPr/>
+        <p:txBody>
+          <a:bodyPr/>
+          <a:lstStyle/>
+          <a:p>
+            <a:fld id="{5A064C77-022D-3743-A04E-645624933D1D}" type="slidenum">
+              <a:rPr lang="en-US" smtClean="0"/>
+              <a:t>12</a:t>
+            </a:fld>
+            <a:endParaRPr lang="en-US"/>
+          </a:p>
+        </p:txBody>
+      </p:sp>
     </p:spTree>
     <p:extLst>
       <p:ext uri="{BB962C8B-B14F-4D97-AF65-F5344CB8AC3E}">
@@ -6873,6 +6943,35 @@
           </a:p>
         </p:txBody>
       </p:sp>
+      <p:sp>
+        <p:nvSpPr>
+          <p:cNvPr id="4" name="Slide Number Placeholder 3">
+            <a:extLst>
+              <a:ext uri="{FF2B5EF4-FFF2-40B4-BE49-F238E27FC236}">
+                <a16:creationId xmlns:a16="http://schemas.microsoft.com/office/drawing/2014/main" id="{FB8F9489-39E1-2E60-D8FA-D5D1ABB8A3B1}"/>
+              </a:ext>
+            </a:extLst>
+          </p:cNvPr>
+          <p:cNvSpPr>
+            <a:spLocks noGrp="1"/>
+          </p:cNvSpPr>
+          <p:nvPr>
+            <p:ph type="sldNum" sz="quarter" idx="12"/>
+          </p:nvPr>
+        </p:nvSpPr>
+        <p:spPr/>
+        <p:txBody>
+          <a:bodyPr/>
+          <a:lstStyle/>
+          <a:p>
+            <a:fld id="{5A064C77-022D-3743-A04E-645624933D1D}" type="slidenum">
+              <a:rPr lang="en-US" smtClean="0"/>
+              <a:t>13</a:t>
+            </a:fld>
+            <a:endParaRPr lang="en-US"/>
+          </a:p>
+        </p:txBody>
+      </p:sp>
     </p:spTree>
     <p:extLst>
       <p:ext uri="{BB962C8B-B14F-4D97-AF65-F5344CB8AC3E}">
@@ -7105,6 +7204,35 @@
               <a:t>etc</a:t>
             </a:r>
             <a:endParaRPr lang="en-US" dirty="0"/>
+          </a:p>
+        </p:txBody>
+      </p:sp>
+      <p:sp>
+        <p:nvSpPr>
+          <p:cNvPr id="2" name="Slide Number Placeholder 1">
+            <a:extLst>
+              <a:ext uri="{FF2B5EF4-FFF2-40B4-BE49-F238E27FC236}">
+                <a16:creationId xmlns:a16="http://schemas.microsoft.com/office/drawing/2014/main" id="{25CCBEC4-BB91-E87B-EEC0-29277B047A03}"/>
+              </a:ext>
+            </a:extLst>
+          </p:cNvPr>
+          <p:cNvSpPr>
+            <a:spLocks noGrp="1"/>
+          </p:cNvSpPr>
+          <p:nvPr>
+            <p:ph type="sldNum" sz="quarter" idx="12"/>
+          </p:nvPr>
+        </p:nvSpPr>
+        <p:spPr/>
+        <p:txBody>
+          <a:bodyPr/>
+          <a:lstStyle/>
+          <a:p>
+            <a:fld id="{5A064C77-022D-3743-A04E-645624933D1D}" type="slidenum">
+              <a:rPr lang="en-US" smtClean="0"/>
+              <a:t>14</a:t>
+            </a:fld>
+            <a:endParaRPr lang="en-US"/>
           </a:p>
         </p:txBody>
       </p:sp>
@@ -8389,6 +8517,35 @@
           </a:graphicData>
         </a:graphic>
       </p:graphicFrame>
+      <p:sp>
+        <p:nvSpPr>
+          <p:cNvPr id="4" name="Slide Number Placeholder 3">
+            <a:extLst>
+              <a:ext uri="{FF2B5EF4-FFF2-40B4-BE49-F238E27FC236}">
+                <a16:creationId xmlns:a16="http://schemas.microsoft.com/office/drawing/2014/main" id="{5CC6B4FB-FD34-177D-BAE1-05D1DDC6F3FA}"/>
+              </a:ext>
+            </a:extLst>
+          </p:cNvPr>
+          <p:cNvSpPr>
+            <a:spLocks noGrp="1"/>
+          </p:cNvSpPr>
+          <p:nvPr>
+            <p:ph type="sldNum" sz="quarter" idx="12"/>
+          </p:nvPr>
+        </p:nvSpPr>
+        <p:spPr/>
+        <p:txBody>
+          <a:bodyPr/>
+          <a:lstStyle/>
+          <a:p>
+            <a:fld id="{5A064C77-022D-3743-A04E-645624933D1D}" type="slidenum">
+              <a:rPr lang="en-US" smtClean="0"/>
+              <a:t>15</a:t>
+            </a:fld>
+            <a:endParaRPr lang="en-US"/>
+          </a:p>
+        </p:txBody>
+      </p:sp>
     </p:spTree>
     <p:extLst>
       <p:ext uri="{BB962C8B-B14F-4D97-AF65-F5344CB8AC3E}">
@@ -8424,7 +8581,7 @@
           <p:cNvPr id="2" name="Title 1">
             <a:extLst>
               <a:ext uri="{FF2B5EF4-FFF2-40B4-BE49-F238E27FC236}">
-                <a16:creationId xmlns:a16="http://schemas.microsoft.com/office/drawing/2014/main" id="{7430C11C-1AF0-5222-43C3-8B227297B6E3}"/>
+                <a16:creationId xmlns:a16="http://schemas.microsoft.com/office/drawing/2014/main" id="{3CB0384E-963F-048E-956A-8A65F8A612B3}"/>
               </a:ext>
             </a:extLst>
           </p:cNvPr>
@@ -8441,8 +8598,8 @@
           <a:lstStyle/>
           <a:p>
             <a:r>
-              <a:rPr lang="en-US" dirty="0"/>
-              <a:t>Other variants</a:t>
+              <a:rPr lang="en-IE" dirty="0"/>
+              <a:t>Pre-training	</a:t>
             </a:r>
           </a:p>
         </p:txBody>
@@ -8452,7 +8609,7 @@
           <p:cNvPr id="3" name="Content Placeholder 2">
             <a:extLst>
               <a:ext uri="{FF2B5EF4-FFF2-40B4-BE49-F238E27FC236}">
-                <a16:creationId xmlns:a16="http://schemas.microsoft.com/office/drawing/2014/main" id="{8E86EC3B-829A-552E-7B12-68B68FBD3EEA}"/>
+                <a16:creationId xmlns:a16="http://schemas.microsoft.com/office/drawing/2014/main" id="{EE0DFEA6-BDAB-9E9C-AE26-2B860DDD1665}"/>
               </a:ext>
             </a:extLst>
           </p:cNvPr>
@@ -8466,6 +8623,147 @@
         <p:spPr/>
         <p:txBody>
           <a:bodyPr>
+            <a:normAutofit lnSpcReduction="10000"/>
+          </a:bodyPr>
+          <a:lstStyle/>
+          <a:p>
+            <a:r>
+              <a:rPr lang="en-IE" dirty="0"/>
+              <a:t>Use, for example, before full model fitting to obtain better values of embeddings or other aspects of the model.</a:t>
+            </a:r>
+          </a:p>
+          <a:p>
+            <a:r>
+              <a:rPr lang="en-IE" dirty="0"/>
+              <a:t>Take a large data set and try to learn something simple from it before you run it on your specific task.</a:t>
+            </a:r>
+          </a:p>
+          <a:p>
+            <a:r>
+              <a:rPr lang="en-IE" dirty="0"/>
+              <a:t>E.g. predict next item in a sequence, mask out some part of the values and predict them.</a:t>
+            </a:r>
+          </a:p>
+          <a:p>
+            <a:r>
+              <a:rPr lang="en-IE" dirty="0"/>
+              <a:t>Makes the later fitting of the model much easier.</a:t>
+            </a:r>
+          </a:p>
+          <a:p>
+            <a:r>
+              <a:rPr lang="en-IE" dirty="0"/>
+              <a:t>Does add computational cost and sometimes worsens bias on training data.</a:t>
+            </a:r>
+          </a:p>
+        </p:txBody>
+      </p:sp>
+      <p:sp>
+        <p:nvSpPr>
+          <p:cNvPr id="4" name="Slide Number Placeholder 3">
+            <a:extLst>
+              <a:ext uri="{FF2B5EF4-FFF2-40B4-BE49-F238E27FC236}">
+                <a16:creationId xmlns:a16="http://schemas.microsoft.com/office/drawing/2014/main" id="{F31883C3-8925-E75E-3D30-E1F5E0170F65}"/>
+              </a:ext>
+            </a:extLst>
+          </p:cNvPr>
+          <p:cNvSpPr>
+            <a:spLocks noGrp="1"/>
+          </p:cNvSpPr>
+          <p:nvPr>
+            <p:ph type="sldNum" sz="quarter" idx="12"/>
+          </p:nvPr>
+        </p:nvSpPr>
+        <p:spPr/>
+        <p:txBody>
+          <a:bodyPr/>
+          <a:lstStyle/>
+          <a:p>
+            <a:fld id="{5A064C77-022D-3743-A04E-645624933D1D}" type="slidenum">
+              <a:rPr lang="en-US" smtClean="0"/>
+              <a:t>16</a:t>
+            </a:fld>
+            <a:endParaRPr lang="en-US"/>
+          </a:p>
+        </p:txBody>
+      </p:sp>
+    </p:spTree>
+    <p:extLst>
+      <p:ext uri="{BB962C8B-B14F-4D97-AF65-F5344CB8AC3E}">
+        <p14:creationId xmlns:p14="http://schemas.microsoft.com/office/powerpoint/2010/main" val="1433505763"/>
+      </p:ext>
+    </p:extLst>
+  </p:cSld>
+  <p:clrMapOvr>
+    <a:masterClrMapping/>
+  </p:clrMapOvr>
+</p:sld>
+</file>
+
+<file path=ppt/slides/slide17.xml><?xml version="1.0" encoding="utf-8"?>
+<p:sld xmlns:a="http://schemas.openxmlformats.org/drawingml/2006/main" xmlns:r="http://schemas.openxmlformats.org/officeDocument/2006/relationships" xmlns:p="http://schemas.openxmlformats.org/presentationml/2006/main">
+  <p:cSld>
+    <p:spTree>
+      <p:nvGrpSpPr>
+        <p:cNvPr id="1" name=""/>
+        <p:cNvGrpSpPr/>
+        <p:nvPr/>
+      </p:nvGrpSpPr>
+      <p:grpSpPr>
+        <a:xfrm>
+          <a:off x="0" y="0"/>
+          <a:ext cx="0" cy="0"/>
+          <a:chOff x="0" y="0"/>
+          <a:chExt cx="0" cy="0"/>
+        </a:xfrm>
+      </p:grpSpPr>
+      <p:sp>
+        <p:nvSpPr>
+          <p:cNvPr id="2" name="Title 1">
+            <a:extLst>
+              <a:ext uri="{FF2B5EF4-FFF2-40B4-BE49-F238E27FC236}">
+                <a16:creationId xmlns:a16="http://schemas.microsoft.com/office/drawing/2014/main" id="{7430C11C-1AF0-5222-43C3-8B227297B6E3}"/>
+              </a:ext>
+            </a:extLst>
+          </p:cNvPr>
+          <p:cNvSpPr>
+            <a:spLocks noGrp="1"/>
+          </p:cNvSpPr>
+          <p:nvPr>
+            <p:ph type="title"/>
+          </p:nvPr>
+        </p:nvSpPr>
+        <p:spPr/>
+        <p:txBody>
+          <a:bodyPr/>
+          <a:lstStyle/>
+          <a:p>
+            <a:r>
+              <a:rPr lang="en-US" dirty="0"/>
+              <a:t>Other variants</a:t>
+            </a:r>
+          </a:p>
+        </p:txBody>
+      </p:sp>
+      <p:sp>
+        <p:nvSpPr>
+          <p:cNvPr id="3" name="Content Placeholder 2">
+            <a:extLst>
+              <a:ext uri="{FF2B5EF4-FFF2-40B4-BE49-F238E27FC236}">
+                <a16:creationId xmlns:a16="http://schemas.microsoft.com/office/drawing/2014/main" id="{8E86EC3B-829A-552E-7B12-68B68FBD3EEA}"/>
+              </a:ext>
+            </a:extLst>
+          </p:cNvPr>
+          <p:cNvSpPr>
+            <a:spLocks noGrp="1"/>
+          </p:cNvSpPr>
+          <p:nvPr>
+            <p:ph idx="1"/>
+          </p:nvPr>
+        </p:nvSpPr>
+        <p:spPr/>
+        <p:txBody>
+          <a:bodyPr>
             <a:normAutofit/>
           </a:bodyPr>
           <a:lstStyle/>
@@ -8516,6 +8814,35 @@
               <a:rPr lang="en-US" dirty="0"/>
               <a:t>.</a:t>
             </a:r>
+          </a:p>
+        </p:txBody>
+      </p:sp>
+      <p:sp>
+        <p:nvSpPr>
+          <p:cNvPr id="4" name="Slide Number Placeholder 3">
+            <a:extLst>
+              <a:ext uri="{FF2B5EF4-FFF2-40B4-BE49-F238E27FC236}">
+                <a16:creationId xmlns:a16="http://schemas.microsoft.com/office/drawing/2014/main" id="{46740391-670B-A3A5-DC0C-7A1A36B08786}"/>
+              </a:ext>
+            </a:extLst>
+          </p:cNvPr>
+          <p:cNvSpPr>
+            <a:spLocks noGrp="1"/>
+          </p:cNvSpPr>
+          <p:nvPr>
+            <p:ph type="sldNum" sz="quarter" idx="12"/>
+          </p:nvPr>
+        </p:nvSpPr>
+        <p:spPr/>
+        <p:txBody>
+          <a:bodyPr/>
+          <a:lstStyle/>
+          <a:p>
+            <a:fld id="{5A064C77-022D-3743-A04E-645624933D1D}" type="slidenum">
+              <a:rPr lang="en-US" smtClean="0"/>
+              <a:t>17</a:t>
+            </a:fld>
+            <a:endParaRPr lang="en-US"/>
           </a:p>
         </p:txBody>
       </p:sp>
@@ -8532,7 +8859,7 @@
 </p:sld>
 </file>
 
-<file path=ppt/slides/slide17.xml><?xml version="1.0" encoding="utf-8"?>
+<file path=ppt/slides/slide18.xml><?xml version="1.0" encoding="utf-8"?>
 <p:sld xmlns:a="http://schemas.openxmlformats.org/drawingml/2006/main" xmlns:r="http://schemas.openxmlformats.org/officeDocument/2006/relationships" xmlns:p="http://schemas.openxmlformats.org/presentationml/2006/main">
   <p:cSld>
     <p:spTree>
@@ -8706,145 +9033,39 @@
           </p:sp>
         </mc:Fallback>
       </mc:AlternateContent>
+      <p:sp>
+        <p:nvSpPr>
+          <p:cNvPr id="4" name="Slide Number Placeholder 3">
+            <a:extLst>
+              <a:ext uri="{FF2B5EF4-FFF2-40B4-BE49-F238E27FC236}">
+                <a16:creationId xmlns:a16="http://schemas.microsoft.com/office/drawing/2014/main" id="{7862494B-BFFA-01A4-EF36-07B008D03294}"/>
+              </a:ext>
+            </a:extLst>
+          </p:cNvPr>
+          <p:cNvSpPr>
+            <a:spLocks noGrp="1"/>
+          </p:cNvSpPr>
+          <p:nvPr>
+            <p:ph type="sldNum" sz="quarter" idx="12"/>
+          </p:nvPr>
+        </p:nvSpPr>
+        <p:spPr/>
+        <p:txBody>
+          <a:bodyPr/>
+          <a:lstStyle/>
+          <a:p>
+            <a:fld id="{5A064C77-022D-3743-A04E-645624933D1D}" type="slidenum">
+              <a:rPr lang="en-US" smtClean="0"/>
+              <a:t>18</a:t>
+            </a:fld>
+            <a:endParaRPr lang="en-US"/>
+          </a:p>
+        </p:txBody>
+      </p:sp>
     </p:spTree>
     <p:extLst>
       <p:ext uri="{BB962C8B-B14F-4D97-AF65-F5344CB8AC3E}">
         <p14:creationId xmlns:p14="http://schemas.microsoft.com/office/powerpoint/2010/main" val="1417039880"/>
-      </p:ext>
-    </p:extLst>
-  </p:cSld>
-  <p:clrMapOvr>
-    <a:masterClrMapping/>
-  </p:clrMapOvr>
-</p:sld>
-</file>
-
-<file path=ppt/slides/slide18.xml><?xml version="1.0" encoding="utf-8"?>
-<p:sld xmlns:a="http://schemas.openxmlformats.org/drawingml/2006/main" xmlns:r="http://schemas.openxmlformats.org/officeDocument/2006/relationships" xmlns:p="http://schemas.openxmlformats.org/presentationml/2006/main">
-  <p:cSld>
-    <p:spTree>
-      <p:nvGrpSpPr>
-        <p:cNvPr id="1" name=""/>
-        <p:cNvGrpSpPr/>
-        <p:nvPr/>
-      </p:nvGrpSpPr>
-      <p:grpSpPr>
-        <a:xfrm>
-          <a:off x="0" y="0"/>
-          <a:ext cx="0" cy="0"/>
-          <a:chOff x="0" y="0"/>
-          <a:chExt cx="0" cy="0"/>
-        </a:xfrm>
-      </p:grpSpPr>
-      <p:sp>
-        <p:nvSpPr>
-          <p:cNvPr id="2" name="Title 1">
-            <a:extLst>
-              <a:ext uri="{FF2B5EF4-FFF2-40B4-BE49-F238E27FC236}">
-                <a16:creationId xmlns:a16="http://schemas.microsoft.com/office/drawing/2014/main" id="{B5399CAB-C059-A355-C946-789034171161}"/>
-              </a:ext>
-            </a:extLst>
-          </p:cNvPr>
-          <p:cNvSpPr>
-            <a:spLocks noGrp="1"/>
-          </p:cNvSpPr>
-          <p:nvPr>
-            <p:ph type="title"/>
-          </p:nvPr>
-        </p:nvSpPr>
-        <p:spPr/>
-        <p:txBody>
-          <a:bodyPr/>
-          <a:lstStyle/>
-          <a:p>
-            <a:r>
-              <a:rPr lang="en-US" dirty="0"/>
-              <a:t>Link with AIFS</a:t>
-            </a:r>
-          </a:p>
-        </p:txBody>
-      </p:sp>
-      <p:sp>
-        <p:nvSpPr>
-          <p:cNvPr id="3" name="Content Placeholder 2">
-            <a:extLst>
-              <a:ext uri="{FF2B5EF4-FFF2-40B4-BE49-F238E27FC236}">
-                <a16:creationId xmlns:a16="http://schemas.microsoft.com/office/drawing/2014/main" id="{7AE92B9F-687F-9243-3AFC-A4AD6840D2EB}"/>
-              </a:ext>
-            </a:extLst>
-          </p:cNvPr>
-          <p:cNvSpPr>
-            <a:spLocks noGrp="1"/>
-          </p:cNvSpPr>
-          <p:nvPr>
-            <p:ph idx="1"/>
-          </p:nvPr>
-        </p:nvSpPr>
-        <p:spPr>
-          <a:xfrm>
-            <a:off x="838200" y="1825625"/>
-            <a:ext cx="4161020" cy="4149290"/>
-          </a:xfrm>
-        </p:spPr>
-        <p:txBody>
-          <a:bodyPr>
-            <a:normAutofit lnSpcReduction="10000"/>
-          </a:bodyPr>
-          <a:lstStyle/>
-          <a:p>
-            <a:r>
-              <a:rPr lang="en-US" dirty="0"/>
-              <a:t>Apart from the graph structure (next class) this is exactly the background in ECMWF’s AIFS forecasting system</a:t>
-            </a:r>
-          </a:p>
-          <a:p>
-            <a:r>
-              <a:rPr lang="en-US" dirty="0"/>
-              <a:t>They predict multiple variables 6 hours ahead</a:t>
-            </a:r>
-          </a:p>
-          <a:p>
-            <a:r>
-              <a:rPr lang="en-US" dirty="0"/>
-              <a:t>Takes a week to run with 64 A100 GPUs (we only have 100)</a:t>
-            </a:r>
-          </a:p>
-        </p:txBody>
-      </p:sp>
-      <p:pic>
-        <p:nvPicPr>
-          <p:cNvPr id="4" name="Picture 3">
-            <a:extLst>
-              <a:ext uri="{FF2B5EF4-FFF2-40B4-BE49-F238E27FC236}">
-                <a16:creationId xmlns:a16="http://schemas.microsoft.com/office/drawing/2014/main" id="{0722553E-3E4C-09FE-CB8B-113FDBAA7117}"/>
-              </a:ext>
-            </a:extLst>
-          </p:cNvPr>
-          <p:cNvPicPr>
-            <a:picLocks noChangeAspect="1"/>
-          </p:cNvPicPr>
-          <p:nvPr/>
-        </p:nvPicPr>
-        <p:blipFill>
-          <a:blip r:embed="rId2"/>
-          <a:stretch>
-            <a:fillRect/>
-          </a:stretch>
-        </p:blipFill>
-        <p:spPr>
-          <a:xfrm>
-            <a:off x="5651274" y="1527097"/>
-            <a:ext cx="6054795" cy="3923726"/>
-          </a:xfrm>
-          <a:prstGeom prst="rect">
-            <a:avLst/>
-          </a:prstGeom>
-        </p:spPr>
-      </p:pic>
-    </p:spTree>
-    <p:extLst>
-      <p:ext uri="{BB962C8B-B14F-4D97-AF65-F5344CB8AC3E}">
-        <p14:creationId xmlns:p14="http://schemas.microsoft.com/office/powerpoint/2010/main" val="2916108506"/>
       </p:ext>
     </p:extLst>
   </p:cSld>
@@ -8876,7 +9097,7 @@
           <p:cNvPr id="2" name="Title 1">
             <a:extLst>
               <a:ext uri="{FF2B5EF4-FFF2-40B4-BE49-F238E27FC236}">
-                <a16:creationId xmlns:a16="http://schemas.microsoft.com/office/drawing/2014/main" id="{5052E3C7-E02A-F443-93FF-99B0D12844EC}"/>
+                <a16:creationId xmlns:a16="http://schemas.microsoft.com/office/drawing/2014/main" id="{B5399CAB-C059-A355-C946-789034171161}"/>
               </a:ext>
             </a:extLst>
           </p:cNvPr>
@@ -8894,7 +9115,7 @@
           <a:p>
             <a:r>
               <a:rPr lang="en-US" dirty="0"/>
-              <a:t>Summary</a:t>
+              <a:t>Link with AIFS</a:t>
             </a:r>
           </a:p>
         </p:txBody>
@@ -8904,7 +9125,7 @@
           <p:cNvPr id="3" name="Content Placeholder 2">
             <a:extLst>
               <a:ext uri="{FF2B5EF4-FFF2-40B4-BE49-F238E27FC236}">
-                <a16:creationId xmlns:a16="http://schemas.microsoft.com/office/drawing/2014/main" id="{92B1495C-38DD-F9F0-478E-D16C6E4C61EA}"/>
+                <a16:creationId xmlns:a16="http://schemas.microsoft.com/office/drawing/2014/main" id="{7AE92B9F-687F-9243-3AFC-A4AD6840D2EB}"/>
               </a:ext>
             </a:extLst>
           </p:cNvPr>
@@ -8915,80 +9136,100 @@
             <p:ph idx="1"/>
           </p:nvPr>
         </p:nvSpPr>
-        <p:spPr/>
+        <p:spPr>
+          <a:xfrm>
+            <a:off x="838200" y="1825625"/>
+            <a:ext cx="4161020" cy="4149290"/>
+          </a:xfrm>
+        </p:spPr>
         <p:txBody>
           <a:bodyPr>
-            <a:normAutofit fontScale="92500" lnSpcReduction="20000"/>
+            <a:normAutofit lnSpcReduction="10000"/>
           </a:bodyPr>
           <a:lstStyle/>
           <a:p>
-            <a:pPr marL="457200" indent="-457200">
-              <a:buFont typeface="Arial" panose="020B0604020202020204" pitchFamily="34" charset="0"/>
-              <a:buChar char="•"/>
-            </a:pPr>
             <a:r>
               <a:rPr lang="en-US" dirty="0"/>
-              <a:t>Transformers replace recurrence with attention, enabling </a:t>
-            </a:r>
-            <a:r>
-              <a:rPr lang="en-US" dirty="0" err="1"/>
-              <a:t>parallelisation</a:t>
-            </a:r>
+              <a:t>Apart from the graph structure (next class) this is exactly the background in ECMWF’s AIFS forecasting system</a:t>
+            </a:r>
+          </a:p>
+          <a:p>
             <a:r>
               <a:rPr lang="en-US" dirty="0"/>
-              <a:t> and capturing long‑range dependencies.</a:t>
-            </a:r>
-          </a:p>
-          <a:p>
-            <a:pPr marL="457200" indent="-457200">
-              <a:buFont typeface="Arial" panose="020B0604020202020204" pitchFamily="34" charset="0"/>
-              <a:buChar char="•"/>
-            </a:pPr>
+              <a:t>They predict multiple variables 6 hours ahead</a:t>
+            </a:r>
+          </a:p>
+          <a:p>
             <a:r>
               <a:rPr lang="en-US" dirty="0"/>
-              <a:t>Scaled dot‑product and multi‑head attention are core building blocks.</a:t>
-            </a:r>
-          </a:p>
-          <a:p>
-            <a:pPr marL="457200" indent="-457200">
-              <a:buFont typeface="Arial" panose="020B0604020202020204" pitchFamily="34" charset="0"/>
-              <a:buChar char="•"/>
-            </a:pPr>
-            <a:r>
-              <a:rPr lang="en-US" dirty="0"/>
-              <a:t>Positional encoding injects order information into the model.</a:t>
-            </a:r>
-          </a:p>
-          <a:p>
-            <a:pPr marL="457200" indent="-457200">
-              <a:buFont typeface="Arial" panose="020B0604020202020204" pitchFamily="34" charset="0"/>
-              <a:buChar char="•"/>
-            </a:pPr>
-            <a:r>
-              <a:rPr lang="en-US" dirty="0"/>
-              <a:t>On weather forecasting, transformers handle multivariate sequences effectively when sequence length is moderate.</a:t>
-            </a:r>
-          </a:p>
-          <a:p>
-            <a:pPr marL="457200" indent="-457200">
-              <a:buFont typeface="Arial" panose="020B0604020202020204" pitchFamily="34" charset="0"/>
-              <a:buChar char="•"/>
-            </a:pPr>
-            <a:r>
-              <a:rPr lang="en-US" dirty="0" err="1"/>
-              <a:t>PyTorch</a:t>
-            </a:r>
-            <a:r>
-              <a:rPr lang="en-US" dirty="0"/>
-              <a:t> makes fitting these kinds of models relatively easy.</a:t>
-            </a:r>
+              <a:t>Takes a week to run with 64 A100 GPUs (we only have 100)</a:t>
+            </a:r>
+          </a:p>
+        </p:txBody>
+      </p:sp>
+      <p:pic>
+        <p:nvPicPr>
+          <p:cNvPr id="4" name="Picture 3">
+            <a:extLst>
+              <a:ext uri="{FF2B5EF4-FFF2-40B4-BE49-F238E27FC236}">
+                <a16:creationId xmlns:a16="http://schemas.microsoft.com/office/drawing/2014/main" id="{0722553E-3E4C-09FE-CB8B-113FDBAA7117}"/>
+              </a:ext>
+            </a:extLst>
+          </p:cNvPr>
+          <p:cNvPicPr>
+            <a:picLocks noChangeAspect="1"/>
+          </p:cNvPicPr>
+          <p:nvPr/>
+        </p:nvPicPr>
+        <p:blipFill>
+          <a:blip r:embed="rId2"/>
+          <a:stretch>
+            <a:fillRect/>
+          </a:stretch>
+        </p:blipFill>
+        <p:spPr>
+          <a:xfrm>
+            <a:off x="5651274" y="1527097"/>
+            <a:ext cx="6054795" cy="3923726"/>
+          </a:xfrm>
+          <a:prstGeom prst="rect">
+            <a:avLst/>
+          </a:prstGeom>
+        </p:spPr>
+      </p:pic>
+      <p:sp>
+        <p:nvSpPr>
+          <p:cNvPr id="5" name="Slide Number Placeholder 4">
+            <a:extLst>
+              <a:ext uri="{FF2B5EF4-FFF2-40B4-BE49-F238E27FC236}">
+                <a16:creationId xmlns:a16="http://schemas.microsoft.com/office/drawing/2014/main" id="{EB06E4CD-68DB-F90A-4D01-AA3227626585}"/>
+              </a:ext>
+            </a:extLst>
+          </p:cNvPr>
+          <p:cNvSpPr>
+            <a:spLocks noGrp="1"/>
+          </p:cNvSpPr>
+          <p:nvPr>
+            <p:ph type="sldNum" sz="quarter" idx="12"/>
+          </p:nvPr>
+        </p:nvSpPr>
+        <p:spPr/>
+        <p:txBody>
+          <a:bodyPr/>
+          <a:lstStyle/>
+          <a:p>
+            <a:fld id="{5A064C77-022D-3743-A04E-645624933D1D}" type="slidenum">
+              <a:rPr lang="en-US" smtClean="0"/>
+              <a:t>19</a:t>
+            </a:fld>
+            <a:endParaRPr lang="en-US"/>
           </a:p>
         </p:txBody>
       </p:sp>
     </p:spTree>
     <p:extLst>
       <p:ext uri="{BB962C8B-B14F-4D97-AF65-F5344CB8AC3E}">
-        <p14:creationId xmlns:p14="http://schemas.microsoft.com/office/powerpoint/2010/main" val="2902375257"/>
+        <p14:creationId xmlns:p14="http://schemas.microsoft.com/office/powerpoint/2010/main" val="2916108506"/>
       </p:ext>
     </p:extLst>
   </p:cSld>
@@ -9118,6 +9359,35 @@
               <a:rPr lang="en-US" dirty="0"/>
               <a:t>Summary &amp; Reading</a:t>
             </a:r>
+          </a:p>
+        </p:txBody>
+      </p:sp>
+      <p:sp>
+        <p:nvSpPr>
+          <p:cNvPr id="4" name="Slide Number Placeholder 3">
+            <a:extLst>
+              <a:ext uri="{FF2B5EF4-FFF2-40B4-BE49-F238E27FC236}">
+                <a16:creationId xmlns:a16="http://schemas.microsoft.com/office/drawing/2014/main" id="{444B997E-3A83-9889-6828-1FFDC690F749}"/>
+              </a:ext>
+            </a:extLst>
+          </p:cNvPr>
+          <p:cNvSpPr>
+            <a:spLocks noGrp="1"/>
+          </p:cNvSpPr>
+          <p:nvPr>
+            <p:ph type="sldNum" sz="quarter" idx="12"/>
+          </p:nvPr>
+        </p:nvSpPr>
+        <p:spPr/>
+        <p:txBody>
+          <a:bodyPr/>
+          <a:lstStyle/>
+          <a:p>
+            <a:fld id="{5A064C77-022D-3743-A04E-645624933D1D}" type="slidenum">
+              <a:rPr lang="en-US" smtClean="0"/>
+              <a:t>2</a:t>
+            </a:fld>
+            <a:endParaRPr lang="en-US"/>
           </a:p>
         </p:txBody>
       </p:sp>
@@ -9156,6 +9426,150 @@
           <p:cNvPr id="2" name="Title 1">
             <a:extLst>
               <a:ext uri="{FF2B5EF4-FFF2-40B4-BE49-F238E27FC236}">
+                <a16:creationId xmlns:a16="http://schemas.microsoft.com/office/drawing/2014/main" id="{5052E3C7-E02A-F443-93FF-99B0D12844EC}"/>
+              </a:ext>
+            </a:extLst>
+          </p:cNvPr>
+          <p:cNvSpPr>
+            <a:spLocks noGrp="1"/>
+          </p:cNvSpPr>
+          <p:nvPr>
+            <p:ph type="title"/>
+          </p:nvPr>
+        </p:nvSpPr>
+        <p:spPr/>
+        <p:txBody>
+          <a:bodyPr/>
+          <a:lstStyle/>
+          <a:p>
+            <a:r>
+              <a:rPr lang="en-US" dirty="0"/>
+              <a:t>Summary</a:t>
+            </a:r>
+          </a:p>
+        </p:txBody>
+      </p:sp>
+      <p:sp>
+        <p:nvSpPr>
+          <p:cNvPr id="3" name="Content Placeholder 2">
+            <a:extLst>
+              <a:ext uri="{FF2B5EF4-FFF2-40B4-BE49-F238E27FC236}">
+                <a16:creationId xmlns:a16="http://schemas.microsoft.com/office/drawing/2014/main" id="{92B1495C-38DD-F9F0-478E-D16C6E4C61EA}"/>
+              </a:ext>
+            </a:extLst>
+          </p:cNvPr>
+          <p:cNvSpPr>
+            <a:spLocks noGrp="1"/>
+          </p:cNvSpPr>
+          <p:nvPr>
+            <p:ph idx="1"/>
+          </p:nvPr>
+        </p:nvSpPr>
+        <p:spPr/>
+        <p:txBody>
+          <a:bodyPr>
+            <a:normAutofit fontScale="92500" lnSpcReduction="20000"/>
+          </a:bodyPr>
+          <a:lstStyle/>
+          <a:p>
+            <a:pPr marL="457200" indent="-457200">
+              <a:buFont typeface="Arial" panose="020B0604020202020204" pitchFamily="34" charset="0"/>
+              <a:buChar char="•"/>
+            </a:pPr>
+            <a:r>
+              <a:rPr lang="en-US" dirty="0"/>
+              <a:t>Transformers replace recurrence with attention, enabling </a:t>
+            </a:r>
+            <a:r>
+              <a:rPr lang="en-US" dirty="0" err="1"/>
+              <a:t>parallelisation</a:t>
+            </a:r>
+            <a:r>
+              <a:rPr lang="en-US" dirty="0"/>
+              <a:t> and capturing long‑range dependencies.</a:t>
+            </a:r>
+          </a:p>
+          <a:p>
+            <a:pPr marL="457200" indent="-457200">
+              <a:buFont typeface="Arial" panose="020B0604020202020204" pitchFamily="34" charset="0"/>
+              <a:buChar char="•"/>
+            </a:pPr>
+            <a:r>
+              <a:rPr lang="en-US" dirty="0"/>
+              <a:t>Scaled dot‑product and multi‑head attention are core building blocks.</a:t>
+            </a:r>
+          </a:p>
+          <a:p>
+            <a:pPr marL="457200" indent="-457200">
+              <a:buFont typeface="Arial" panose="020B0604020202020204" pitchFamily="34" charset="0"/>
+              <a:buChar char="•"/>
+            </a:pPr>
+            <a:r>
+              <a:rPr lang="en-US" dirty="0"/>
+              <a:t>Positional encoding injects order information into the model.</a:t>
+            </a:r>
+          </a:p>
+          <a:p>
+            <a:pPr marL="457200" indent="-457200">
+              <a:buFont typeface="Arial" panose="020B0604020202020204" pitchFamily="34" charset="0"/>
+              <a:buChar char="•"/>
+            </a:pPr>
+            <a:r>
+              <a:rPr lang="en-US" dirty="0"/>
+              <a:t>On weather forecasting, transformers handle multivariate sequences effectively when sequence length is moderate.</a:t>
+            </a:r>
+          </a:p>
+          <a:p>
+            <a:pPr marL="457200" indent="-457200">
+              <a:buFont typeface="Arial" panose="020B0604020202020204" pitchFamily="34" charset="0"/>
+              <a:buChar char="•"/>
+            </a:pPr>
+            <a:r>
+              <a:rPr lang="en-US" dirty="0" err="1"/>
+              <a:t>PyTorch</a:t>
+            </a:r>
+            <a:r>
+              <a:rPr lang="en-US" dirty="0"/>
+              <a:t> makes fitting these kinds of models relatively easy.</a:t>
+            </a:r>
+          </a:p>
+        </p:txBody>
+      </p:sp>
+    </p:spTree>
+    <p:extLst>
+      <p:ext uri="{BB962C8B-B14F-4D97-AF65-F5344CB8AC3E}">
+        <p14:creationId xmlns:p14="http://schemas.microsoft.com/office/powerpoint/2010/main" val="2902375257"/>
+      </p:ext>
+    </p:extLst>
+  </p:cSld>
+  <p:clrMapOvr>
+    <a:masterClrMapping/>
+  </p:clrMapOvr>
+</p:sld>
+</file>
+
+<file path=ppt/slides/slide21.xml><?xml version="1.0" encoding="utf-8"?>
+<p:sld xmlns:a="http://schemas.openxmlformats.org/drawingml/2006/main" xmlns:r="http://schemas.openxmlformats.org/officeDocument/2006/relationships" xmlns:p="http://schemas.openxmlformats.org/presentationml/2006/main">
+  <p:cSld>
+    <p:spTree>
+      <p:nvGrpSpPr>
+        <p:cNvPr id="1" name=""/>
+        <p:cNvGrpSpPr/>
+        <p:nvPr/>
+      </p:nvGrpSpPr>
+      <p:grpSpPr>
+        <a:xfrm>
+          <a:off x="0" y="0"/>
+          <a:ext cx="0" cy="0"/>
+          <a:chOff x="0" y="0"/>
+          <a:chExt cx="0" cy="0"/>
+        </a:xfrm>
+      </p:grpSpPr>
+      <p:sp>
+        <p:nvSpPr>
+          <p:cNvPr id="2" name="Title 1">
+            <a:extLst>
+              <a:ext uri="{FF2B5EF4-FFF2-40B4-BE49-F238E27FC236}">
                 <a16:creationId xmlns:a16="http://schemas.microsoft.com/office/drawing/2014/main" id="{5272E10E-525F-42F7-F943-C6C1FF1B7CC1}"/>
               </a:ext>
             </a:extLst>
@@ -9227,7 +9641,7 @@
 </p:sld>
 </file>
 
-<file path=ppt/slides/slide21.xml><?xml version="1.0" encoding="utf-8"?>
+<file path=ppt/slides/slide22.xml><?xml version="1.0" encoding="utf-8"?>
 <p:sld xmlns:a="http://schemas.openxmlformats.org/drawingml/2006/main" xmlns:r="http://schemas.openxmlformats.org/officeDocument/2006/relationships" xmlns:p="http://schemas.openxmlformats.org/presentationml/2006/main">
   <p:cSld>
     <p:spTree>
@@ -10286,6 +10700,35 @@
           </a:graphicData>
         </a:graphic>
       </p:graphicFrame>
+      <p:sp>
+        <p:nvSpPr>
+          <p:cNvPr id="5" name="Slide Number Placeholder 4">
+            <a:extLst>
+              <a:ext uri="{FF2B5EF4-FFF2-40B4-BE49-F238E27FC236}">
+                <a16:creationId xmlns:a16="http://schemas.microsoft.com/office/drawing/2014/main" id="{EE6E007D-944F-89D9-0A95-FB6FDFC98574}"/>
+              </a:ext>
+            </a:extLst>
+          </p:cNvPr>
+          <p:cNvSpPr>
+            <a:spLocks noGrp="1"/>
+          </p:cNvSpPr>
+          <p:nvPr>
+            <p:ph type="sldNum" sz="quarter" idx="12"/>
+          </p:nvPr>
+        </p:nvSpPr>
+        <p:spPr/>
+        <p:txBody>
+          <a:bodyPr/>
+          <a:lstStyle/>
+          <a:p>
+            <a:fld id="{5A064C77-022D-3743-A04E-645624933D1D}" type="slidenum">
+              <a:rPr lang="en-US" smtClean="0"/>
+              <a:t>3</a:t>
+            </a:fld>
+            <a:endParaRPr lang="en-US"/>
+          </a:p>
+        </p:txBody>
+      </p:sp>
     </p:spTree>
     <p:extLst>
       <p:ext uri="{BB962C8B-B14F-4D97-AF65-F5344CB8AC3E}">
@@ -10421,6 +10864,35 @@
               <a:rPr lang="en-US" dirty="0"/>
               <a:t>to make sure the order of the sequence matters</a:t>
             </a:r>
+          </a:p>
+        </p:txBody>
+      </p:sp>
+      <p:sp>
+        <p:nvSpPr>
+          <p:cNvPr id="4" name="Slide Number Placeholder 3">
+            <a:extLst>
+              <a:ext uri="{FF2B5EF4-FFF2-40B4-BE49-F238E27FC236}">
+                <a16:creationId xmlns:a16="http://schemas.microsoft.com/office/drawing/2014/main" id="{D9181F8C-573D-EB0F-1314-68E747641B2C}"/>
+              </a:ext>
+            </a:extLst>
+          </p:cNvPr>
+          <p:cNvSpPr>
+            <a:spLocks noGrp="1"/>
+          </p:cNvSpPr>
+          <p:nvPr>
+            <p:ph type="sldNum" sz="quarter" idx="12"/>
+          </p:nvPr>
+        </p:nvSpPr>
+        <p:spPr/>
+        <p:txBody>
+          <a:bodyPr/>
+          <a:lstStyle/>
+          <a:p>
+            <a:fld id="{5A064C77-022D-3743-A04E-645624933D1D}" type="slidenum">
+              <a:rPr lang="en-US" smtClean="0"/>
+              <a:t>4</a:t>
+            </a:fld>
+            <a:endParaRPr lang="en-US"/>
           </a:p>
         </p:txBody>
       </p:sp>
@@ -10749,6 +11221,35 @@
           </p:sp>
         </mc:Fallback>
       </mc:AlternateContent>
+      <p:sp>
+        <p:nvSpPr>
+          <p:cNvPr id="4" name="Slide Number Placeholder 3">
+            <a:extLst>
+              <a:ext uri="{FF2B5EF4-FFF2-40B4-BE49-F238E27FC236}">
+                <a16:creationId xmlns:a16="http://schemas.microsoft.com/office/drawing/2014/main" id="{FE44AF93-1933-E9EB-5621-A44BBEDE9A63}"/>
+              </a:ext>
+            </a:extLst>
+          </p:cNvPr>
+          <p:cNvSpPr>
+            <a:spLocks noGrp="1"/>
+          </p:cNvSpPr>
+          <p:nvPr>
+            <p:ph type="sldNum" sz="quarter" idx="12"/>
+          </p:nvPr>
+        </p:nvSpPr>
+        <p:spPr/>
+        <p:txBody>
+          <a:bodyPr/>
+          <a:lstStyle/>
+          <a:p>
+            <a:fld id="{5A064C77-022D-3743-A04E-645624933D1D}" type="slidenum">
+              <a:rPr lang="en-US" smtClean="0"/>
+              <a:t>5</a:t>
+            </a:fld>
+            <a:endParaRPr lang="en-US"/>
+          </a:p>
+        </p:txBody>
+      </p:sp>
     </p:spTree>
     <p:extLst>
       <p:ext uri="{BB962C8B-B14F-4D97-AF65-F5344CB8AC3E}">
@@ -11021,6 +11522,35 @@
           </p:sp>
         </mc:Fallback>
       </mc:AlternateContent>
+      <p:sp>
+        <p:nvSpPr>
+          <p:cNvPr id="4" name="Slide Number Placeholder 3">
+            <a:extLst>
+              <a:ext uri="{FF2B5EF4-FFF2-40B4-BE49-F238E27FC236}">
+                <a16:creationId xmlns:a16="http://schemas.microsoft.com/office/drawing/2014/main" id="{02288244-9FA1-01CF-D9F8-D8F9754B2186}"/>
+              </a:ext>
+            </a:extLst>
+          </p:cNvPr>
+          <p:cNvSpPr>
+            <a:spLocks noGrp="1"/>
+          </p:cNvSpPr>
+          <p:nvPr>
+            <p:ph type="sldNum" sz="quarter" idx="12"/>
+          </p:nvPr>
+        </p:nvSpPr>
+        <p:spPr/>
+        <p:txBody>
+          <a:bodyPr/>
+          <a:lstStyle/>
+          <a:p>
+            <a:fld id="{5A064C77-022D-3743-A04E-645624933D1D}" type="slidenum">
+              <a:rPr lang="en-US" smtClean="0"/>
+              <a:t>6</a:t>
+            </a:fld>
+            <a:endParaRPr lang="en-US"/>
+          </a:p>
+        </p:txBody>
+      </p:sp>
     </p:spTree>
     <p:extLst>
       <p:ext uri="{BB962C8B-B14F-4D97-AF65-F5344CB8AC3E}">
@@ -11111,6 +11641,35 @@
           </a:p>
         </p:txBody>
       </p:sp>
+      <p:sp>
+        <p:nvSpPr>
+          <p:cNvPr id="4" name="Slide Number Placeholder 3">
+            <a:extLst>
+              <a:ext uri="{FF2B5EF4-FFF2-40B4-BE49-F238E27FC236}">
+                <a16:creationId xmlns:a16="http://schemas.microsoft.com/office/drawing/2014/main" id="{656A6AA0-274F-5AA0-9414-EC9BD4407DA1}"/>
+              </a:ext>
+            </a:extLst>
+          </p:cNvPr>
+          <p:cNvSpPr>
+            <a:spLocks noGrp="1"/>
+          </p:cNvSpPr>
+          <p:nvPr>
+            <p:ph type="sldNum" sz="quarter" idx="12"/>
+          </p:nvPr>
+        </p:nvSpPr>
+        <p:spPr/>
+        <p:txBody>
+          <a:bodyPr/>
+          <a:lstStyle/>
+          <a:p>
+            <a:fld id="{5A064C77-022D-3743-A04E-645624933D1D}" type="slidenum">
+              <a:rPr lang="en-US" smtClean="0"/>
+              <a:t>7</a:t>
+            </a:fld>
+            <a:endParaRPr lang="en-US"/>
+          </a:p>
+        </p:txBody>
+      </p:sp>
     </p:spTree>
     <p:extLst>
       <p:ext uri="{BB962C8B-B14F-4D97-AF65-F5344CB8AC3E}">
@@ -11230,6 +11789,35 @@
               <a:rPr lang="en-US" dirty="0"/>
               <a:t>Added in a decoder. </a:t>
             </a:r>
+          </a:p>
+        </p:txBody>
+      </p:sp>
+      <p:sp>
+        <p:nvSpPr>
+          <p:cNvPr id="4" name="Slide Number Placeholder 3">
+            <a:extLst>
+              <a:ext uri="{FF2B5EF4-FFF2-40B4-BE49-F238E27FC236}">
+                <a16:creationId xmlns:a16="http://schemas.microsoft.com/office/drawing/2014/main" id="{C4269D74-36E6-E096-6637-E7213AF7470B}"/>
+              </a:ext>
+            </a:extLst>
+          </p:cNvPr>
+          <p:cNvSpPr>
+            <a:spLocks noGrp="1"/>
+          </p:cNvSpPr>
+          <p:nvPr>
+            <p:ph type="sldNum" sz="quarter" idx="12"/>
+          </p:nvPr>
+        </p:nvSpPr>
+        <p:spPr/>
+        <p:txBody>
+          <a:bodyPr/>
+          <a:lstStyle/>
+          <a:p>
+            <a:fld id="{5A064C77-022D-3743-A04E-645624933D1D}" type="slidenum">
+              <a:rPr lang="en-US" smtClean="0"/>
+              <a:t>8</a:t>
+            </a:fld>
+            <a:endParaRPr lang="en-US"/>
           </a:p>
         </p:txBody>
       </p:sp>
@@ -11415,6 +12003,35 @@
           </p:sp>
         </mc:Fallback>
       </mc:AlternateContent>
+      <p:sp>
+        <p:nvSpPr>
+          <p:cNvPr id="4" name="Slide Number Placeholder 3">
+            <a:extLst>
+              <a:ext uri="{FF2B5EF4-FFF2-40B4-BE49-F238E27FC236}">
+                <a16:creationId xmlns:a16="http://schemas.microsoft.com/office/drawing/2014/main" id="{41B43947-B4F4-73BE-620B-86C1DC828C7D}"/>
+              </a:ext>
+            </a:extLst>
+          </p:cNvPr>
+          <p:cNvSpPr>
+            <a:spLocks noGrp="1"/>
+          </p:cNvSpPr>
+          <p:nvPr>
+            <p:ph type="sldNum" sz="quarter" idx="12"/>
+          </p:nvPr>
+        </p:nvSpPr>
+        <p:spPr/>
+        <p:txBody>
+          <a:bodyPr/>
+          <a:lstStyle/>
+          <a:p>
+            <a:fld id="{5A064C77-022D-3743-A04E-645624933D1D}" type="slidenum">
+              <a:rPr lang="en-US" smtClean="0"/>
+              <a:t>9</a:t>
+            </a:fld>
+            <a:endParaRPr lang="en-US"/>
+          </a:p>
+        </p:txBody>
+      </p:sp>
     </p:spTree>
     <p:extLst>
       <p:ext uri="{BB962C8B-B14F-4D97-AF65-F5344CB8AC3E}">

</xml_diff>